<commit_message>
Unos 5-tog i 6tog prdavana
</commit_message>
<xml_diff>
--- a/03 Predavanje/RSII -Lesson 03.pptx
+++ b/03 Predavanje/RSII -Lesson 03.pptx
@@ -948,7 +948,7 @@
           <a:p>
             <a:fld id="{5F288C43-2B8C-4C7A-913B-0DF20B1E3129}" type="datetimeFigureOut">
               <a:rPr lang="en-US" smtClean="0"/>
-              <a:t>3/29/2019</a:t>
+              <a:t>3/30/2019</a:t>
             </a:fld>
             <a:endParaRPr lang="en-US"/>
           </a:p>
@@ -2201,7 +2201,7 @@
           <a:p>
             <a:fld id="{8460F404-4E92-4556-8167-A1ACF56735A7}" type="datetimeFigureOut">
               <a:rPr lang="en-US" smtClean="0"/>
-              <a:t>3/29/2019</a:t>
+              <a:t>3/30/2019</a:t>
             </a:fld>
             <a:endParaRPr lang="en-US"/>
           </a:p>
@@ -2399,7 +2399,7 @@
           <a:p>
             <a:fld id="{8460F404-4E92-4556-8167-A1ACF56735A7}" type="datetimeFigureOut">
               <a:rPr lang="en-US" smtClean="0"/>
-              <a:t>3/29/2019</a:t>
+              <a:t>3/30/2019</a:t>
             </a:fld>
             <a:endParaRPr lang="en-US"/>
           </a:p>
@@ -2607,7 +2607,7 @@
           <a:p>
             <a:fld id="{8460F404-4E92-4556-8167-A1ACF56735A7}" type="datetimeFigureOut">
               <a:rPr lang="en-US" smtClean="0"/>
-              <a:t>3/29/2019</a:t>
+              <a:t>3/30/2019</a:t>
             </a:fld>
             <a:endParaRPr lang="en-US"/>
           </a:p>
@@ -2805,7 +2805,7 @@
           <a:p>
             <a:fld id="{8460F404-4E92-4556-8167-A1ACF56735A7}" type="datetimeFigureOut">
               <a:rPr lang="en-US" smtClean="0"/>
-              <a:t>3/29/2019</a:t>
+              <a:t>3/30/2019</a:t>
             </a:fld>
             <a:endParaRPr lang="en-US"/>
           </a:p>
@@ -3080,7 +3080,7 @@
           <a:p>
             <a:fld id="{8460F404-4E92-4556-8167-A1ACF56735A7}" type="datetimeFigureOut">
               <a:rPr lang="en-US" smtClean="0"/>
-              <a:t>3/29/2019</a:t>
+              <a:t>3/30/2019</a:t>
             </a:fld>
             <a:endParaRPr lang="en-US"/>
           </a:p>
@@ -3345,7 +3345,7 @@
           <a:p>
             <a:fld id="{8460F404-4E92-4556-8167-A1ACF56735A7}" type="datetimeFigureOut">
               <a:rPr lang="en-US" smtClean="0"/>
-              <a:t>3/29/2019</a:t>
+              <a:t>3/30/2019</a:t>
             </a:fld>
             <a:endParaRPr lang="en-US"/>
           </a:p>
@@ -3757,7 +3757,7 @@
           <a:p>
             <a:fld id="{8460F404-4E92-4556-8167-A1ACF56735A7}" type="datetimeFigureOut">
               <a:rPr lang="en-US" smtClean="0"/>
-              <a:t>3/29/2019</a:t>
+              <a:t>3/30/2019</a:t>
             </a:fld>
             <a:endParaRPr lang="en-US"/>
           </a:p>
@@ -3898,7 +3898,7 @@
           <a:p>
             <a:fld id="{8460F404-4E92-4556-8167-A1ACF56735A7}" type="datetimeFigureOut">
               <a:rPr lang="en-US" smtClean="0"/>
-              <a:t>3/29/2019</a:t>
+              <a:t>3/30/2019</a:t>
             </a:fld>
             <a:endParaRPr lang="en-US"/>
           </a:p>
@@ -4011,7 +4011,7 @@
           <a:p>
             <a:fld id="{8460F404-4E92-4556-8167-A1ACF56735A7}" type="datetimeFigureOut">
               <a:rPr lang="en-US" smtClean="0"/>
-              <a:t>3/29/2019</a:t>
+              <a:t>3/30/2019</a:t>
             </a:fld>
             <a:endParaRPr lang="en-US"/>
           </a:p>
@@ -4322,7 +4322,7 @@
           <a:p>
             <a:fld id="{8460F404-4E92-4556-8167-A1ACF56735A7}" type="datetimeFigureOut">
               <a:rPr lang="en-US" smtClean="0"/>
-              <a:t>3/29/2019</a:t>
+              <a:t>3/30/2019</a:t>
             </a:fld>
             <a:endParaRPr lang="en-US"/>
           </a:p>
@@ -4610,7 +4610,7 @@
           <a:p>
             <a:fld id="{8460F404-4E92-4556-8167-A1ACF56735A7}" type="datetimeFigureOut">
               <a:rPr lang="en-US" smtClean="0"/>
-              <a:t>3/29/2019</a:t>
+              <a:t>3/30/2019</a:t>
             </a:fld>
             <a:endParaRPr lang="en-US"/>
           </a:p>
@@ -4851,7 +4851,7 @@
           <a:p>
             <a:fld id="{8460F404-4E92-4556-8167-A1ACF56735A7}" type="datetimeFigureOut">
               <a:rPr lang="en-US" smtClean="0"/>
-              <a:t>3/29/2019</a:t>
+              <a:t>3/30/2019</a:t>
             </a:fld>
             <a:endParaRPr lang="en-US"/>
           </a:p>

</xml_diff>